<commit_message>
Separate problems from solutions
</commit_message>
<xml_diff>
--- a/2023/2023-03/2023-03-14/problem.pptx
+++ b/2023/2023-03/2023-03-14/problem.pptx
@@ -8,11 +8,8 @@
     <p:sldId id="256" r:id="rId2"/>
     <p:sldId id="268" r:id="rId3"/>
     <p:sldId id="269" r:id="rId4"/>
-    <p:sldId id="267" r:id="rId5"/>
-    <p:sldId id="258" r:id="rId6"/>
-    <p:sldId id="265" r:id="rId7"/>
-    <p:sldId id="259" r:id="rId8"/>
-    <p:sldId id="266" r:id="rId9"/>
+    <p:sldId id="270" r:id="rId5"/>
+    <p:sldId id="265" r:id="rId6"/>
   </p:sldIdLst>
   <p:sldSz cx="12192000" cy="6858000"/>
   <p:notesSz cx="6858000" cy="9144000"/>
@@ -450,7 +447,7 @@
           <a:p>
             <a:fld id="{13CAB402-B863-4AA4-B7CA-C5BADD25EDE0}" type="datetimeFigureOut">
               <a:rPr lang="en-US" smtClean="0"/>
-              <a:t>3/23/2023</a:t>
+              <a:t>3/30/2023</a:t>
             </a:fld>
             <a:endParaRPr lang="en-US"/>
           </a:p>
@@ -774,7 +771,7 @@
           <a:p>
             <a:fld id="{13CAB402-B863-4AA4-B7CA-C5BADD25EDE0}" type="datetimeFigureOut">
               <a:rPr lang="en-US" smtClean="0"/>
-              <a:t>3/23/2023</a:t>
+              <a:t>3/30/2023</a:t>
             </a:fld>
             <a:endParaRPr lang="en-US"/>
           </a:p>
@@ -1022,7 +1019,7 @@
           <a:p>
             <a:fld id="{13CAB402-B863-4AA4-B7CA-C5BADD25EDE0}" type="datetimeFigureOut">
               <a:rPr lang="en-US" smtClean="0"/>
-              <a:t>3/23/2023</a:t>
+              <a:t>3/30/2023</a:t>
             </a:fld>
             <a:endParaRPr lang="en-US"/>
           </a:p>
@@ -1361,7 +1358,7 @@
           <a:p>
             <a:fld id="{13CAB402-B863-4AA4-B7CA-C5BADD25EDE0}" type="datetimeFigureOut">
               <a:rPr lang="en-US" smtClean="0"/>
-              <a:t>3/23/2023</a:t>
+              <a:t>3/30/2023</a:t>
             </a:fld>
             <a:endParaRPr lang="en-US"/>
           </a:p>
@@ -1708,7 +1705,7 @@
           <a:p>
             <a:fld id="{13CAB402-B863-4AA4-B7CA-C5BADD25EDE0}" type="datetimeFigureOut">
               <a:rPr lang="en-US" smtClean="0"/>
-              <a:t>3/23/2023</a:t>
+              <a:t>3/30/2023</a:t>
             </a:fld>
             <a:endParaRPr lang="en-US"/>
           </a:p>
@@ -2082,7 +2079,7 @@
           <a:p>
             <a:fld id="{13CAB402-B863-4AA4-B7CA-C5BADD25EDE0}" type="datetimeFigureOut">
               <a:rPr lang="en-US" smtClean="0"/>
-              <a:t>3/23/2023</a:t>
+              <a:t>3/30/2023</a:t>
             </a:fld>
             <a:endParaRPr lang="en-US"/>
           </a:p>
@@ -2552,7 +2549,7 @@
           <a:p>
             <a:fld id="{13CAB402-B863-4AA4-B7CA-C5BADD25EDE0}" type="datetimeFigureOut">
               <a:rPr lang="en-US" smtClean="0"/>
-              <a:t>3/23/2023</a:t>
+              <a:t>3/30/2023</a:t>
             </a:fld>
             <a:endParaRPr lang="en-US"/>
           </a:p>
@@ -2757,7 +2754,7 @@
           <a:p>
             <a:fld id="{13CAB402-B863-4AA4-B7CA-C5BADD25EDE0}" type="datetimeFigureOut">
               <a:rPr lang="en-US" smtClean="0"/>
-              <a:t>3/23/2023</a:t>
+              <a:t>3/30/2023</a:t>
             </a:fld>
             <a:endParaRPr lang="en-US"/>
           </a:p>
@@ -2968,7 +2965,7 @@
           <a:p>
             <a:fld id="{13CAB402-B863-4AA4-B7CA-C5BADD25EDE0}" type="datetimeFigureOut">
               <a:rPr lang="en-US" smtClean="0"/>
-              <a:t>3/23/2023</a:t>
+              <a:t>3/30/2023</a:t>
             </a:fld>
             <a:endParaRPr lang="en-US"/>
           </a:p>
@@ -3200,7 +3197,7 @@
           <a:p>
             <a:fld id="{13CAB402-B863-4AA4-B7CA-C5BADD25EDE0}" type="datetimeFigureOut">
               <a:rPr lang="en-US" smtClean="0"/>
-              <a:t>3/23/2023</a:t>
+              <a:t>3/30/2023</a:t>
             </a:fld>
             <a:endParaRPr lang="en-US"/>
           </a:p>
@@ -3448,7 +3445,7 @@
           <a:p>
             <a:fld id="{13CAB402-B863-4AA4-B7CA-C5BADD25EDE0}" type="datetimeFigureOut">
               <a:rPr lang="en-US" smtClean="0"/>
-              <a:t>3/23/2023</a:t>
+              <a:t>3/30/2023</a:t>
             </a:fld>
             <a:endParaRPr lang="en-US"/>
           </a:p>
@@ -3746,7 +3743,7 @@
           <a:p>
             <a:fld id="{13CAB402-B863-4AA4-B7CA-C5BADD25EDE0}" type="datetimeFigureOut">
               <a:rPr lang="en-US" smtClean="0"/>
-              <a:t>3/23/2023</a:t>
+              <a:t>3/30/2023</a:t>
             </a:fld>
             <a:endParaRPr lang="en-US"/>
           </a:p>
@@ -4140,7 +4137,7 @@
           <a:p>
             <a:fld id="{13CAB402-B863-4AA4-B7CA-C5BADD25EDE0}" type="datetimeFigureOut">
               <a:rPr lang="en-US" smtClean="0"/>
-              <a:t>3/23/2023</a:t>
+              <a:t>3/30/2023</a:t>
             </a:fld>
             <a:endParaRPr lang="en-US"/>
           </a:p>
@@ -4289,7 +4286,7 @@
           <a:p>
             <a:fld id="{13CAB402-B863-4AA4-B7CA-C5BADD25EDE0}" type="datetimeFigureOut">
               <a:rPr lang="en-US" smtClean="0"/>
-              <a:t>3/23/2023</a:t>
+              <a:t>3/30/2023</a:t>
             </a:fld>
             <a:endParaRPr lang="en-US"/>
           </a:p>
@@ -4415,7 +4412,7 @@
           <a:p>
             <a:fld id="{13CAB402-B863-4AA4-B7CA-C5BADD25EDE0}" type="datetimeFigureOut">
               <a:rPr lang="en-US" smtClean="0"/>
-              <a:t>3/23/2023</a:t>
+              <a:t>3/30/2023</a:t>
             </a:fld>
             <a:endParaRPr lang="en-US"/>
           </a:p>
@@ -4670,7 +4667,7 @@
           <a:p>
             <a:fld id="{13CAB402-B863-4AA4-B7CA-C5BADD25EDE0}" type="datetimeFigureOut">
               <a:rPr lang="en-US" smtClean="0"/>
-              <a:t>3/23/2023</a:t>
+              <a:t>3/30/2023</a:t>
             </a:fld>
             <a:endParaRPr lang="en-US"/>
           </a:p>
@@ -4985,7 +4982,7 @@
           <a:p>
             <a:fld id="{13CAB402-B863-4AA4-B7CA-C5BADD25EDE0}" type="datetimeFigureOut">
               <a:rPr lang="en-US" smtClean="0"/>
-              <a:t>3/23/2023</a:t>
+              <a:t>3/30/2023</a:t>
             </a:fld>
             <a:endParaRPr lang="en-US"/>
           </a:p>
@@ -5336,7 +5333,7 @@
           <a:p>
             <a:fld id="{13CAB402-B863-4AA4-B7CA-C5BADD25EDE0}" type="datetimeFigureOut">
               <a:rPr lang="en-US" smtClean="0"/>
-              <a:t>3/23/2023</a:t>
+              <a:t>3/30/2023</a:t>
             </a:fld>
             <a:endParaRPr lang="en-US"/>
           </a:p>
@@ -6721,7 +6718,7 @@
           <p:cNvPr id="2" name="Title 1">
             <a:extLst>
               <a:ext uri="{FF2B5EF4-FFF2-40B4-BE49-F238E27FC236}">
-                <a16:creationId xmlns:a16="http://schemas.microsoft.com/office/drawing/2014/main" id="{CA317722-9261-B16F-DF2C-8CF6D23E8851}"/>
+                <a16:creationId xmlns:a16="http://schemas.microsoft.com/office/drawing/2014/main" id="{A774A5A3-52BC-6235-25D6-50C10A2E19D6}"/>
               </a:ext>
             </a:extLst>
           </p:cNvPr>
@@ -6729,7 +6726,7 @@
             <a:spLocks noGrp="1"/>
           </p:cNvSpPr>
           <p:nvPr>
-            <p:ph type="ctrTitle"/>
+            <p:ph type="title"/>
           </p:nvPr>
         </p:nvSpPr>
         <p:spPr/>
@@ -6739,17 +6736,17 @@
           <a:p>
             <a:r>
               <a:rPr lang="en-US" dirty="0"/>
-              <a:t>Problem</a:t>
-            </a:r>
-          </a:p>
-        </p:txBody>
-      </p:sp>
-      <p:sp>
-        <p:nvSpPr>
-          <p:cNvPr id="3" name="Subtitle 2">
+              <a:t>Problems</a:t>
+            </a:r>
+          </a:p>
+        </p:txBody>
+      </p:sp>
+      <p:sp>
+        <p:nvSpPr>
+          <p:cNvPr id="3" name="Content Placeholder 2">
             <a:extLst>
               <a:ext uri="{FF2B5EF4-FFF2-40B4-BE49-F238E27FC236}">
-                <a16:creationId xmlns:a16="http://schemas.microsoft.com/office/drawing/2014/main" id="{043C9A1C-775D-C72F-DB2C-E4FD1E85D80F}"/>
+                <a16:creationId xmlns:a16="http://schemas.microsoft.com/office/drawing/2014/main" id="{2A48DA0F-1813-36D0-0596-7DB093241396}"/>
               </a:ext>
             </a:extLst>
           </p:cNvPr>
@@ -6757,7 +6754,7 @@
             <a:spLocks noGrp="1"/>
           </p:cNvSpPr>
           <p:nvPr>
-            <p:ph type="subTitle" idx="1"/>
+            <p:ph idx="1"/>
           </p:nvPr>
         </p:nvSpPr>
         <p:spPr/>
@@ -6765,14 +6762,17 @@
           <a:bodyPr/>
           <a:lstStyle/>
           <a:p>
-            <a:endParaRPr lang="en-US" dirty="0"/>
+            <a:r>
+              <a:rPr lang="en-US" dirty="0"/>
+              <a:t>What are the least number of strokes to draw each of following images?</a:t>
+            </a:r>
           </a:p>
         </p:txBody>
       </p:sp>
     </p:spTree>
     <p:extLst>
       <p:ext uri="{BB962C8B-B14F-4D97-AF65-F5344CB8AC3E}">
-        <p14:creationId xmlns:p14="http://schemas.microsoft.com/office/powerpoint/2010/main" val="542457602"/>
+        <p14:creationId xmlns:p14="http://schemas.microsoft.com/office/powerpoint/2010/main" val="2136967489"/>
       </p:ext>
     </p:extLst>
   </p:cSld>
@@ -6783,66 +6783,6 @@
 </file>
 
 <file path=ppt/slides/slide5.xml><?xml version="1.0" encoding="utf-8"?>
-<p:sld xmlns:a="http://schemas.openxmlformats.org/drawingml/2006/main" xmlns:r="http://schemas.openxmlformats.org/officeDocument/2006/relationships" xmlns:p="http://schemas.openxmlformats.org/presentationml/2006/main">
-  <p:cSld>
-    <p:spTree>
-      <p:nvGrpSpPr>
-        <p:cNvPr id="1" name=""/>
-        <p:cNvGrpSpPr/>
-        <p:nvPr/>
-      </p:nvGrpSpPr>
-      <p:grpSpPr>
-        <a:xfrm>
-          <a:off x="0" y="0"/>
-          <a:ext cx="0" cy="0"/>
-          <a:chOff x="0" y="0"/>
-          <a:chExt cx="0" cy="0"/>
-        </a:xfrm>
-      </p:grpSpPr>
-      <p:sp>
-        <p:nvSpPr>
-          <p:cNvPr id="2" name="Title 1">
-            <a:extLst>
-              <a:ext uri="{FF2B5EF4-FFF2-40B4-BE49-F238E27FC236}">
-                <a16:creationId xmlns:a16="http://schemas.microsoft.com/office/drawing/2014/main" id="{B901A517-98D6-700B-03D7-654147AFC7D7}"/>
-              </a:ext>
-            </a:extLst>
-          </p:cNvPr>
-          <p:cNvSpPr>
-            <a:spLocks noGrp="1"/>
-          </p:cNvSpPr>
-          <p:nvPr>
-            <p:ph type="title"/>
-          </p:nvPr>
-        </p:nvSpPr>
-        <p:spPr/>
-        <p:txBody>
-          <a:bodyPr>
-            <a:normAutofit fontScale="90000"/>
-          </a:bodyPr>
-          <a:lstStyle/>
-          <a:p>
-            <a:r>
-              <a:rPr lang="en-US" dirty="0"/>
-              <a:t>What are the least number of strokes to draw each of following images.</a:t>
-            </a:r>
-          </a:p>
-        </p:txBody>
-      </p:sp>
-    </p:spTree>
-    <p:extLst>
-      <p:ext uri="{BB962C8B-B14F-4D97-AF65-F5344CB8AC3E}">
-        <p14:creationId xmlns:p14="http://schemas.microsoft.com/office/powerpoint/2010/main" val="356587805"/>
-      </p:ext>
-    </p:extLst>
-  </p:cSld>
-  <p:clrMapOvr>
-    <a:masterClrMapping/>
-  </p:clrMapOvr>
-</p:sld>
-</file>
-
-<file path=ppt/slides/slide6.xml><?xml version="1.0" encoding="utf-8"?>
 <p:sld xmlns:a="http://schemas.openxmlformats.org/drawingml/2006/main" xmlns:r="http://schemas.openxmlformats.org/officeDocument/2006/relationships" xmlns:p="http://schemas.openxmlformats.org/presentationml/2006/main">
   <p:cSld>
     <p:spTree>
@@ -9330,185 +9270,6 @@
     <p:extLst>
       <p:ext uri="{BB962C8B-B14F-4D97-AF65-F5344CB8AC3E}">
         <p14:creationId xmlns:p14="http://schemas.microsoft.com/office/powerpoint/2010/main" val="1083118235"/>
-      </p:ext>
-    </p:extLst>
-  </p:cSld>
-  <p:clrMapOvr>
-    <a:masterClrMapping/>
-  </p:clrMapOvr>
-</p:sld>
-</file>
-
-<file path=ppt/slides/slide7.xml><?xml version="1.0" encoding="utf-8"?>
-<p:sld xmlns:a="http://schemas.openxmlformats.org/drawingml/2006/main" xmlns:r="http://schemas.openxmlformats.org/officeDocument/2006/relationships" xmlns:p="http://schemas.openxmlformats.org/presentationml/2006/main">
-  <p:cSld>
-    <p:spTree>
-      <p:nvGrpSpPr>
-        <p:cNvPr id="1" name=""/>
-        <p:cNvGrpSpPr/>
-        <p:nvPr/>
-      </p:nvGrpSpPr>
-      <p:grpSpPr>
-        <a:xfrm>
-          <a:off x="0" y="0"/>
-          <a:ext cx="0" cy="0"/>
-          <a:chOff x="0" y="0"/>
-          <a:chExt cx="0" cy="0"/>
-        </a:xfrm>
-      </p:grpSpPr>
-      <p:sp>
-        <p:nvSpPr>
-          <p:cNvPr id="2" name="Title 1">
-            <a:extLst>
-              <a:ext uri="{FF2B5EF4-FFF2-40B4-BE49-F238E27FC236}">
-                <a16:creationId xmlns:a16="http://schemas.microsoft.com/office/drawing/2014/main" id="{CA317722-9261-B16F-DF2C-8CF6D23E8851}"/>
-              </a:ext>
-            </a:extLst>
-          </p:cNvPr>
-          <p:cNvSpPr>
-            <a:spLocks noGrp="1"/>
-          </p:cNvSpPr>
-          <p:nvPr>
-            <p:ph type="ctrTitle"/>
-          </p:nvPr>
-        </p:nvSpPr>
-        <p:spPr/>
-        <p:txBody>
-          <a:bodyPr/>
-          <a:lstStyle/>
-          <a:p>
-            <a:r>
-              <a:rPr lang="en-US" dirty="0"/>
-              <a:t>Solution</a:t>
-            </a:r>
-          </a:p>
-        </p:txBody>
-      </p:sp>
-      <p:sp>
-        <p:nvSpPr>
-          <p:cNvPr id="3" name="Subtitle 2">
-            <a:extLst>
-              <a:ext uri="{FF2B5EF4-FFF2-40B4-BE49-F238E27FC236}">
-                <a16:creationId xmlns:a16="http://schemas.microsoft.com/office/drawing/2014/main" id="{043C9A1C-775D-C72F-DB2C-E4FD1E85D80F}"/>
-              </a:ext>
-            </a:extLst>
-          </p:cNvPr>
-          <p:cNvSpPr>
-            <a:spLocks noGrp="1"/>
-          </p:cNvSpPr>
-          <p:nvPr>
-            <p:ph type="subTitle" idx="1"/>
-          </p:nvPr>
-        </p:nvSpPr>
-        <p:spPr/>
-        <p:txBody>
-          <a:bodyPr/>
-          <a:lstStyle/>
-          <a:p>
-            <a:endParaRPr lang="en-US" dirty="0"/>
-          </a:p>
-        </p:txBody>
-      </p:sp>
-    </p:spTree>
-    <p:extLst>
-      <p:ext uri="{BB962C8B-B14F-4D97-AF65-F5344CB8AC3E}">
-        <p14:creationId xmlns:p14="http://schemas.microsoft.com/office/powerpoint/2010/main" val="3901014800"/>
-      </p:ext>
-    </p:extLst>
-  </p:cSld>
-  <p:clrMapOvr>
-    <a:masterClrMapping/>
-  </p:clrMapOvr>
-</p:sld>
-</file>
-
-<file path=ppt/slides/slide8.xml><?xml version="1.0" encoding="utf-8"?>
-<p:sld xmlns:a="http://schemas.openxmlformats.org/drawingml/2006/main" xmlns:r="http://schemas.openxmlformats.org/officeDocument/2006/relationships" xmlns:p="http://schemas.openxmlformats.org/presentationml/2006/main">
-  <p:cSld>
-    <p:spTree>
-      <p:nvGrpSpPr>
-        <p:cNvPr id="1" name=""/>
-        <p:cNvGrpSpPr/>
-        <p:nvPr/>
-      </p:nvGrpSpPr>
-      <p:grpSpPr>
-        <a:xfrm>
-          <a:off x="0" y="0"/>
-          <a:ext cx="0" cy="0"/>
-          <a:chOff x="0" y="0"/>
-          <a:chExt cx="0" cy="0"/>
-        </a:xfrm>
-      </p:grpSpPr>
-      <p:sp>
-        <p:nvSpPr>
-          <p:cNvPr id="3" name="Content Placeholder 2">
-            <a:extLst>
-              <a:ext uri="{FF2B5EF4-FFF2-40B4-BE49-F238E27FC236}">
-                <a16:creationId xmlns:a16="http://schemas.microsoft.com/office/drawing/2014/main" id="{96CDCBB5-F920-439D-300B-0E92937B8E3D}"/>
-              </a:ext>
-            </a:extLst>
-          </p:cNvPr>
-          <p:cNvSpPr>
-            <a:spLocks noGrp="1"/>
-          </p:cNvSpPr>
-          <p:nvPr>
-            <p:ph idx="1"/>
-          </p:nvPr>
-        </p:nvSpPr>
-        <p:spPr>
-          <a:xfrm>
-            <a:off x="1295401" y="1136073"/>
-            <a:ext cx="9601196" cy="4739795"/>
-          </a:xfrm>
-        </p:spPr>
-        <p:txBody>
-          <a:bodyPr/>
-          <a:lstStyle/>
-          <a:p>
-            <a:r>
-              <a:rPr lang="en-US" dirty="0"/>
-              <a:t>1) 1</a:t>
-            </a:r>
-          </a:p>
-          <a:p>
-            <a:r>
-              <a:rPr lang="en-US" dirty="0"/>
-              <a:t>2) 1</a:t>
-            </a:r>
-          </a:p>
-          <a:p>
-            <a:r>
-              <a:rPr lang="en-US" dirty="0"/>
-              <a:t>3) 3</a:t>
-            </a:r>
-          </a:p>
-          <a:p>
-            <a:r>
-              <a:rPr lang="en-US" dirty="0"/>
-              <a:t>4) 6</a:t>
-            </a:r>
-          </a:p>
-          <a:p>
-            <a:r>
-              <a:rPr lang="en-US" dirty="0"/>
-              <a:t>5) 1</a:t>
-            </a:r>
-          </a:p>
-          <a:p>
-            <a:r>
-              <a:rPr lang="en-US" dirty="0"/>
-              <a:t>6) 6</a:t>
-            </a:r>
-          </a:p>
-          <a:p>
-            <a:endParaRPr lang="en-US" dirty="0"/>
-          </a:p>
-        </p:txBody>
-      </p:sp>
-    </p:spTree>
-    <p:extLst>
-      <p:ext uri="{BB962C8B-B14F-4D97-AF65-F5344CB8AC3E}">
-        <p14:creationId xmlns:p14="http://schemas.microsoft.com/office/powerpoint/2010/main" val="1547766329"/>
       </p:ext>
     </p:extLst>
   </p:cSld>

</xml_diff>